<commit_message>
ajout anglais et cv 30082024
</commit_message>
<xml_diff>
--- a/english/exercices/introduce myself.pptx
+++ b/english/exercices/introduce myself.pptx
@@ -112,6 +112,11 @@
       </a:defRPr>
     </a:lvl9pPr>
   </p:defaultTextStyle>
+  <p:extLst>
+    <p:ext uri="{EFAFB233-063F-42B5-8137-9DF3F51BA10A}">
+      <p15:sldGuideLst xmlns:p15="http://schemas.microsoft.com/office/powerpoint/2012/main"/>
+    </p:ext>
+  </p:extLst>
 </p:presentation>
 </file>
 
@@ -285,7 +290,7 @@
           <a:p>
             <a:fld id="{48A87A34-81AB-432B-8DAE-1953F412C126}" type="datetimeFigureOut">
               <a:rPr lang="en-US" dirty="0"/>
-              <a:t>7/29/2024</a:t>
+              <a:t>8/30/2024</a:t>
             </a:fld>
             <a:endParaRPr lang="en-US" dirty="0"/>
           </a:p>
@@ -547,7 +552,7 @@
           <a:p>
             <a:fld id="{48A87A34-81AB-432B-8DAE-1953F412C126}" type="datetimeFigureOut">
               <a:rPr lang="en-US" dirty="0"/>
-              <a:t>7/29/2024</a:t>
+              <a:t>8/30/2024</a:t>
             </a:fld>
             <a:endParaRPr lang="en-US" dirty="0"/>
           </a:p>
@@ -774,7 +779,7 @@
             <a:fld id="{48A87A34-81AB-432B-8DAE-1953F412C126}" type="datetimeFigureOut">
               <a:rPr lang="en-US" dirty="0"/>
               <a:pPr/>
-              <a:t>7/29/2024</a:t>
+              <a:t>8/30/2024</a:t>
             </a:fld>
             <a:endParaRPr lang="en-US" dirty="0"/>
           </a:p>
@@ -1080,7 +1085,7 @@
             <a:fld id="{48A87A34-81AB-432B-8DAE-1953F412C126}" type="datetimeFigureOut">
               <a:rPr lang="en-US" dirty="0"/>
               <a:pPr/>
-              <a:t>7/29/2024</a:t>
+              <a:t>8/30/2024</a:t>
             </a:fld>
             <a:endParaRPr lang="en-US" dirty="0"/>
           </a:p>
@@ -1549,7 +1554,7 @@
             <a:fld id="{48A87A34-81AB-432B-8DAE-1953F412C126}" type="datetimeFigureOut">
               <a:rPr lang="en-US" dirty="0"/>
               <a:pPr/>
-              <a:t>7/29/2024</a:t>
+              <a:t>8/30/2024</a:t>
             </a:fld>
             <a:endParaRPr lang="en-US" dirty="0"/>
           </a:p>
@@ -2091,7 +2096,7 @@
           <a:p>
             <a:fld id="{48A87A34-81AB-432B-8DAE-1953F412C126}" type="datetimeFigureOut">
               <a:rPr lang="en-US" dirty="0"/>
-              <a:t>7/29/2024</a:t>
+              <a:t>8/30/2024</a:t>
             </a:fld>
             <a:endParaRPr lang="en-US" dirty="0"/>
           </a:p>
@@ -2860,7 +2865,7 @@
           <a:p>
             <a:fld id="{48A87A34-81AB-432B-8DAE-1953F412C126}" type="datetimeFigureOut">
               <a:rPr lang="en-US" dirty="0"/>
-              <a:t>7/29/2024</a:t>
+              <a:t>8/30/2024</a:t>
             </a:fld>
             <a:endParaRPr lang="en-US" dirty="0"/>
           </a:p>
@@ -3030,7 +3035,7 @@
           <a:p>
             <a:fld id="{48A87A34-81AB-432B-8DAE-1953F412C126}" type="datetimeFigureOut">
               <a:rPr lang="en-US" dirty="0"/>
-              <a:t>7/29/2024</a:t>
+              <a:t>8/30/2024</a:t>
             </a:fld>
             <a:endParaRPr lang="en-US" dirty="0"/>
           </a:p>
@@ -3249,7 +3254,7 @@
             <a:fld id="{48A87A34-81AB-432B-8DAE-1953F412C126}" type="datetimeFigureOut">
               <a:rPr lang="en-US" dirty="0"/>
               <a:pPr/>
-              <a:t>7/29/2024</a:t>
+              <a:t>8/30/2024</a:t>
             </a:fld>
             <a:endParaRPr lang="en-US" dirty="0"/>
           </a:p>
@@ -3424,7 +3429,7 @@
           <a:p>
             <a:fld id="{48A87A34-81AB-432B-8DAE-1953F412C126}" type="datetimeFigureOut">
               <a:rPr lang="en-US" dirty="0"/>
-              <a:t>7/29/2024</a:t>
+              <a:t>8/30/2024</a:t>
             </a:fld>
             <a:endParaRPr lang="en-US" dirty="0"/>
           </a:p>
@@ -3709,7 +3714,7 @@
             <a:fld id="{48A87A34-81AB-432B-8DAE-1953F412C126}" type="datetimeFigureOut">
               <a:rPr lang="en-US" dirty="0"/>
               <a:pPr/>
-              <a:t>7/29/2024</a:t>
+              <a:t>8/30/2024</a:t>
             </a:fld>
             <a:endParaRPr lang="en-US" dirty="0"/>
           </a:p>
@@ -3946,7 +3951,7 @@
           <a:p>
             <a:fld id="{48A87A34-81AB-432B-8DAE-1953F412C126}" type="datetimeFigureOut">
               <a:rPr lang="en-US" dirty="0"/>
-              <a:t>7/29/2024</a:t>
+              <a:t>8/30/2024</a:t>
             </a:fld>
             <a:endParaRPr lang="en-US" dirty="0"/>
           </a:p>
@@ -4320,7 +4325,7 @@
           <a:p>
             <a:fld id="{48A87A34-81AB-432B-8DAE-1953F412C126}" type="datetimeFigureOut">
               <a:rPr lang="en-US" dirty="0"/>
-              <a:t>7/29/2024</a:t>
+              <a:t>8/30/2024</a:t>
             </a:fld>
             <a:endParaRPr lang="en-US" dirty="0"/>
           </a:p>
@@ -4433,7 +4438,7 @@
           <a:p>
             <a:fld id="{48A87A34-81AB-432B-8DAE-1953F412C126}" type="datetimeFigureOut">
               <a:rPr lang="en-US" dirty="0"/>
-              <a:t>7/29/2024</a:t>
+              <a:t>8/30/2024</a:t>
             </a:fld>
             <a:endParaRPr lang="en-US" dirty="0"/>
           </a:p>
@@ -4523,7 +4528,7 @@
           <a:p>
             <a:fld id="{48A87A34-81AB-432B-8DAE-1953F412C126}" type="datetimeFigureOut">
               <a:rPr lang="en-US" dirty="0"/>
-              <a:t>7/29/2024</a:t>
+              <a:t>8/30/2024</a:t>
             </a:fld>
             <a:endParaRPr lang="en-US" dirty="0"/>
           </a:p>
@@ -4767,7 +4772,7 @@
           <a:p>
             <a:fld id="{48A87A34-81AB-432B-8DAE-1953F412C126}" type="datetimeFigureOut">
               <a:rPr lang="en-US" dirty="0"/>
-              <a:t>7/29/2024</a:t>
+              <a:t>8/30/2024</a:t>
             </a:fld>
             <a:endParaRPr lang="en-US" dirty="0"/>
           </a:p>
@@ -5019,7 +5024,7 @@
           <a:p>
             <a:fld id="{48A87A34-81AB-432B-8DAE-1953F412C126}" type="datetimeFigureOut">
               <a:rPr lang="en-US" dirty="0"/>
-              <a:t>7/29/2024</a:t>
+              <a:t>8/30/2024</a:t>
             </a:fld>
             <a:endParaRPr lang="en-US" dirty="0"/>
           </a:p>
@@ -5258,7 +5263,7 @@
             <a:fld id="{48A87A34-81AB-432B-8DAE-1953F412C126}" type="datetimeFigureOut">
               <a:rPr lang="en-US" dirty="0"/>
               <a:pPr/>
-              <a:t>7/29/2024</a:t>
+              <a:t>8/30/2024</a:t>
             </a:fld>
             <a:endParaRPr lang="en-US" dirty="0"/>
           </a:p>
@@ -5699,6 +5704,93 @@
           </a:p>
         </p:txBody>
       </p:sp>
+      <p:sp>
+        <p:nvSpPr>
+          <p:cNvPr id="2" name="Pentagone 1"/>
+          <p:cNvSpPr/>
+          <p:nvPr/>
+        </p:nvSpPr>
+        <p:spPr>
+          <a:xfrm rot="5400000">
+            <a:off x="10702636" y="29095"/>
+            <a:ext cx="1039091" cy="980901"/>
+          </a:xfrm>
+          <a:prstGeom prst="homePlate">
+            <a:avLst/>
+          </a:prstGeom>
+          <a:solidFill>
+            <a:srgbClr val="F8C0C0"/>
+          </a:solidFill>
+          <a:ln>
+            <a:solidFill>
+              <a:srgbClr val="F8C0C0"/>
+            </a:solidFill>
+          </a:ln>
+        </p:spPr>
+        <p:style>
+          <a:lnRef idx="2">
+            <a:schemeClr val="accent1">
+              <a:shade val="50000"/>
+            </a:schemeClr>
+          </a:lnRef>
+          <a:fillRef idx="1">
+            <a:schemeClr val="accent1"/>
+          </a:fillRef>
+          <a:effectRef idx="0">
+            <a:schemeClr val="accent1"/>
+          </a:effectRef>
+          <a:fontRef idx="minor">
+            <a:schemeClr val="lt1"/>
+          </a:fontRef>
+        </p:style>
+        <p:txBody>
+          <a:bodyPr rtlCol="0" anchor="ctr"/>
+          <a:lstStyle/>
+          <a:p>
+            <a:pPr algn="ctr"/>
+            <a:endParaRPr lang="fr-FR"/>
+          </a:p>
+        </p:txBody>
+      </p:sp>
+      <p:sp>
+        <p:nvSpPr>
+          <p:cNvPr id="3" name="ZoneTexte 2"/>
+          <p:cNvSpPr txBox="1"/>
+          <p:nvPr/>
+        </p:nvSpPr>
+        <p:spPr>
+          <a:xfrm>
+            <a:off x="10931235" y="91440"/>
+            <a:ext cx="581891" cy="584775"/>
+          </a:xfrm>
+          <a:prstGeom prst="rect">
+            <a:avLst/>
+          </a:prstGeom>
+          <a:noFill/>
+        </p:spPr>
+        <p:txBody>
+          <a:bodyPr wrap="square" rtlCol="0">
+            <a:spAutoFit/>
+          </a:bodyPr>
+          <a:lstStyle/>
+          <a:p>
+            <a:pPr algn="ctr"/>
+            <a:r>
+              <a:rPr lang="fr-FR" sz="3200" dirty="0" smtClean="0">
+                <a:solidFill>
+                  <a:schemeClr val="bg1"/>
+                </a:solidFill>
+              </a:rPr>
+              <a:t>1</a:t>
+            </a:r>
+            <a:endParaRPr lang="fr-FR" sz="3200" dirty="0">
+              <a:solidFill>
+                <a:schemeClr val="bg1"/>
+              </a:solidFill>
+            </a:endParaRPr>
+          </a:p>
+        </p:txBody>
+      </p:sp>
     </p:spTree>
     <p:extLst>
       <p:ext uri="{BB962C8B-B14F-4D97-AF65-F5344CB8AC3E}">
@@ -5881,6 +5973,93 @@
             </a:r>
             <a:endParaRPr lang="fr-FR" b="1" dirty="0">
               <a:latin typeface="Arial Black" panose="020B0A04020102020204" pitchFamily="34" charset="0"/>
+            </a:endParaRPr>
+          </a:p>
+        </p:txBody>
+      </p:sp>
+      <p:sp>
+        <p:nvSpPr>
+          <p:cNvPr id="10" name="Pentagone 9"/>
+          <p:cNvSpPr/>
+          <p:nvPr/>
+        </p:nvSpPr>
+        <p:spPr>
+          <a:xfrm rot="5400000">
+            <a:off x="10702636" y="29095"/>
+            <a:ext cx="1039091" cy="980901"/>
+          </a:xfrm>
+          <a:prstGeom prst="homePlate">
+            <a:avLst/>
+          </a:prstGeom>
+          <a:solidFill>
+            <a:srgbClr val="F8C0C0"/>
+          </a:solidFill>
+          <a:ln>
+            <a:solidFill>
+              <a:srgbClr val="F8C0C0"/>
+            </a:solidFill>
+          </a:ln>
+        </p:spPr>
+        <p:style>
+          <a:lnRef idx="2">
+            <a:schemeClr val="accent1">
+              <a:shade val="50000"/>
+            </a:schemeClr>
+          </a:lnRef>
+          <a:fillRef idx="1">
+            <a:schemeClr val="accent1"/>
+          </a:fillRef>
+          <a:effectRef idx="0">
+            <a:schemeClr val="accent1"/>
+          </a:effectRef>
+          <a:fontRef idx="minor">
+            <a:schemeClr val="lt1"/>
+          </a:fontRef>
+        </p:style>
+        <p:txBody>
+          <a:bodyPr rtlCol="0" anchor="ctr"/>
+          <a:lstStyle/>
+          <a:p>
+            <a:pPr algn="ctr"/>
+            <a:endParaRPr lang="fr-FR"/>
+          </a:p>
+        </p:txBody>
+      </p:sp>
+      <p:sp>
+        <p:nvSpPr>
+          <p:cNvPr id="11" name="ZoneTexte 10"/>
+          <p:cNvSpPr txBox="1"/>
+          <p:nvPr/>
+        </p:nvSpPr>
+        <p:spPr>
+          <a:xfrm>
+            <a:off x="10931235" y="91440"/>
+            <a:ext cx="581891" cy="584775"/>
+          </a:xfrm>
+          <a:prstGeom prst="rect">
+            <a:avLst/>
+          </a:prstGeom>
+          <a:noFill/>
+        </p:spPr>
+        <p:txBody>
+          <a:bodyPr wrap="square" rtlCol="0">
+            <a:spAutoFit/>
+          </a:bodyPr>
+          <a:lstStyle/>
+          <a:p>
+            <a:pPr algn="ctr"/>
+            <a:r>
+              <a:rPr lang="fr-FR" sz="3200" dirty="0">
+                <a:solidFill>
+                  <a:schemeClr val="bg1"/>
+                </a:solidFill>
+              </a:rPr>
+              <a:t>2</a:t>
+            </a:r>
+            <a:endParaRPr lang="fr-FR" sz="3200" dirty="0">
+              <a:solidFill>
+                <a:schemeClr val="bg1"/>
+              </a:solidFill>
             </a:endParaRPr>
           </a:p>
         </p:txBody>
@@ -6078,6 +6257,93 @@
           </a:effectLst>
         </p:spPr>
       </p:pic>
+      <p:sp>
+        <p:nvSpPr>
+          <p:cNvPr id="9" name="Pentagone 8"/>
+          <p:cNvSpPr/>
+          <p:nvPr/>
+        </p:nvSpPr>
+        <p:spPr>
+          <a:xfrm rot="5400000">
+            <a:off x="10702636" y="29095"/>
+            <a:ext cx="1039091" cy="980901"/>
+          </a:xfrm>
+          <a:prstGeom prst="homePlate">
+            <a:avLst/>
+          </a:prstGeom>
+          <a:solidFill>
+            <a:srgbClr val="F8C0C0"/>
+          </a:solidFill>
+          <a:ln>
+            <a:solidFill>
+              <a:srgbClr val="F8C0C0"/>
+            </a:solidFill>
+          </a:ln>
+        </p:spPr>
+        <p:style>
+          <a:lnRef idx="2">
+            <a:schemeClr val="accent1">
+              <a:shade val="50000"/>
+            </a:schemeClr>
+          </a:lnRef>
+          <a:fillRef idx="1">
+            <a:schemeClr val="accent1"/>
+          </a:fillRef>
+          <a:effectRef idx="0">
+            <a:schemeClr val="accent1"/>
+          </a:effectRef>
+          <a:fontRef idx="minor">
+            <a:schemeClr val="lt1"/>
+          </a:fontRef>
+        </p:style>
+        <p:txBody>
+          <a:bodyPr rtlCol="0" anchor="ctr"/>
+          <a:lstStyle/>
+          <a:p>
+            <a:pPr algn="ctr"/>
+            <a:endParaRPr lang="fr-FR"/>
+          </a:p>
+        </p:txBody>
+      </p:sp>
+      <p:sp>
+        <p:nvSpPr>
+          <p:cNvPr id="10" name="ZoneTexte 9"/>
+          <p:cNvSpPr txBox="1"/>
+          <p:nvPr/>
+        </p:nvSpPr>
+        <p:spPr>
+          <a:xfrm>
+            <a:off x="10931235" y="91440"/>
+            <a:ext cx="581891" cy="584775"/>
+          </a:xfrm>
+          <a:prstGeom prst="rect">
+            <a:avLst/>
+          </a:prstGeom>
+          <a:noFill/>
+        </p:spPr>
+        <p:txBody>
+          <a:bodyPr wrap="square" rtlCol="0">
+            <a:spAutoFit/>
+          </a:bodyPr>
+          <a:lstStyle/>
+          <a:p>
+            <a:pPr algn="ctr"/>
+            <a:r>
+              <a:rPr lang="fr-FR" sz="3200" dirty="0">
+                <a:solidFill>
+                  <a:schemeClr val="bg1"/>
+                </a:solidFill>
+              </a:rPr>
+              <a:t>3</a:t>
+            </a:r>
+            <a:endParaRPr lang="fr-FR" sz="3200" dirty="0">
+              <a:solidFill>
+                <a:schemeClr val="bg1"/>
+              </a:solidFill>
+            </a:endParaRPr>
+          </a:p>
+        </p:txBody>
+      </p:sp>
     </p:spTree>
     <p:extLst>
       <p:ext uri="{BB962C8B-B14F-4D97-AF65-F5344CB8AC3E}">
@@ -6138,6 +6404,93 @@
           </a:prstGeom>
         </p:spPr>
       </p:pic>
+      <p:sp>
+        <p:nvSpPr>
+          <p:cNvPr id="3" name="Pentagone 2"/>
+          <p:cNvSpPr/>
+          <p:nvPr/>
+        </p:nvSpPr>
+        <p:spPr>
+          <a:xfrm rot="5400000">
+            <a:off x="10702636" y="29095"/>
+            <a:ext cx="1039091" cy="980901"/>
+          </a:xfrm>
+          <a:prstGeom prst="homePlate">
+            <a:avLst/>
+          </a:prstGeom>
+          <a:solidFill>
+            <a:srgbClr val="F8C0C0"/>
+          </a:solidFill>
+          <a:ln>
+            <a:solidFill>
+              <a:srgbClr val="F8C0C0"/>
+            </a:solidFill>
+          </a:ln>
+        </p:spPr>
+        <p:style>
+          <a:lnRef idx="2">
+            <a:schemeClr val="accent1">
+              <a:shade val="50000"/>
+            </a:schemeClr>
+          </a:lnRef>
+          <a:fillRef idx="1">
+            <a:schemeClr val="accent1"/>
+          </a:fillRef>
+          <a:effectRef idx="0">
+            <a:schemeClr val="accent1"/>
+          </a:effectRef>
+          <a:fontRef idx="minor">
+            <a:schemeClr val="lt1"/>
+          </a:fontRef>
+        </p:style>
+        <p:txBody>
+          <a:bodyPr rtlCol="0" anchor="ctr"/>
+          <a:lstStyle/>
+          <a:p>
+            <a:pPr algn="ctr"/>
+            <a:endParaRPr lang="fr-FR"/>
+          </a:p>
+        </p:txBody>
+      </p:sp>
+      <p:sp>
+        <p:nvSpPr>
+          <p:cNvPr id="5" name="ZoneTexte 4"/>
+          <p:cNvSpPr txBox="1"/>
+          <p:nvPr/>
+        </p:nvSpPr>
+        <p:spPr>
+          <a:xfrm>
+            <a:off x="10931235" y="91440"/>
+            <a:ext cx="581891" cy="584775"/>
+          </a:xfrm>
+          <a:prstGeom prst="rect">
+            <a:avLst/>
+          </a:prstGeom>
+          <a:noFill/>
+        </p:spPr>
+        <p:txBody>
+          <a:bodyPr wrap="square" rtlCol="0">
+            <a:spAutoFit/>
+          </a:bodyPr>
+          <a:lstStyle/>
+          <a:p>
+            <a:pPr algn="ctr"/>
+            <a:r>
+              <a:rPr lang="fr-FR" sz="3200" dirty="0">
+                <a:solidFill>
+                  <a:schemeClr val="bg1"/>
+                </a:solidFill>
+              </a:rPr>
+              <a:t>4</a:t>
+            </a:r>
+            <a:endParaRPr lang="fr-FR" sz="3200" dirty="0">
+              <a:solidFill>
+                <a:schemeClr val="bg1"/>
+              </a:solidFill>
+            </a:endParaRPr>
+          </a:p>
+        </p:txBody>
+      </p:sp>
     </p:spTree>
     <p:extLst>
       <p:ext uri="{BB962C8B-B14F-4D97-AF65-F5344CB8AC3E}">
@@ -6268,6 +6621,93 @@
           </a:prstGeom>
         </p:spPr>
       </p:pic>
+      <p:sp>
+        <p:nvSpPr>
+          <p:cNvPr id="7" name="Pentagone 6"/>
+          <p:cNvSpPr/>
+          <p:nvPr/>
+        </p:nvSpPr>
+        <p:spPr>
+          <a:xfrm rot="5400000">
+            <a:off x="10702636" y="29095"/>
+            <a:ext cx="1039091" cy="980901"/>
+          </a:xfrm>
+          <a:prstGeom prst="homePlate">
+            <a:avLst/>
+          </a:prstGeom>
+          <a:solidFill>
+            <a:srgbClr val="F8C0C0"/>
+          </a:solidFill>
+          <a:ln>
+            <a:solidFill>
+              <a:srgbClr val="F8C0C0"/>
+            </a:solidFill>
+          </a:ln>
+        </p:spPr>
+        <p:style>
+          <a:lnRef idx="2">
+            <a:schemeClr val="accent1">
+              <a:shade val="50000"/>
+            </a:schemeClr>
+          </a:lnRef>
+          <a:fillRef idx="1">
+            <a:schemeClr val="accent1"/>
+          </a:fillRef>
+          <a:effectRef idx="0">
+            <a:schemeClr val="accent1"/>
+          </a:effectRef>
+          <a:fontRef idx="minor">
+            <a:schemeClr val="lt1"/>
+          </a:fontRef>
+        </p:style>
+        <p:txBody>
+          <a:bodyPr rtlCol="0" anchor="ctr"/>
+          <a:lstStyle/>
+          <a:p>
+            <a:pPr algn="ctr"/>
+            <a:endParaRPr lang="fr-FR"/>
+          </a:p>
+        </p:txBody>
+      </p:sp>
+      <p:sp>
+        <p:nvSpPr>
+          <p:cNvPr id="8" name="ZoneTexte 7"/>
+          <p:cNvSpPr txBox="1"/>
+          <p:nvPr/>
+        </p:nvSpPr>
+        <p:spPr>
+          <a:xfrm>
+            <a:off x="10931235" y="91440"/>
+            <a:ext cx="581891" cy="584775"/>
+          </a:xfrm>
+          <a:prstGeom prst="rect">
+            <a:avLst/>
+          </a:prstGeom>
+          <a:noFill/>
+        </p:spPr>
+        <p:txBody>
+          <a:bodyPr wrap="square" rtlCol="0">
+            <a:spAutoFit/>
+          </a:bodyPr>
+          <a:lstStyle/>
+          <a:p>
+            <a:pPr algn="ctr"/>
+            <a:r>
+              <a:rPr lang="fr-FR" sz="3200" dirty="0">
+                <a:solidFill>
+                  <a:schemeClr val="bg1"/>
+                </a:solidFill>
+              </a:rPr>
+              <a:t>5</a:t>
+            </a:r>
+            <a:endParaRPr lang="fr-FR" sz="3200" dirty="0">
+              <a:solidFill>
+                <a:schemeClr val="bg1"/>
+              </a:solidFill>
+            </a:endParaRPr>
+          </a:p>
+        </p:txBody>
+      </p:sp>
     </p:spTree>
     <p:extLst>
       <p:ext uri="{BB962C8B-B14F-4D97-AF65-F5344CB8AC3E}">
@@ -6388,6 +6828,93 @@
           </a:prstGeom>
         </p:spPr>
       </p:pic>
+      <p:sp>
+        <p:nvSpPr>
+          <p:cNvPr id="7" name="Pentagone 6"/>
+          <p:cNvSpPr/>
+          <p:nvPr/>
+        </p:nvSpPr>
+        <p:spPr>
+          <a:xfrm rot="5400000">
+            <a:off x="10702636" y="29095"/>
+            <a:ext cx="1039091" cy="980901"/>
+          </a:xfrm>
+          <a:prstGeom prst="homePlate">
+            <a:avLst/>
+          </a:prstGeom>
+          <a:solidFill>
+            <a:srgbClr val="F8C0C0"/>
+          </a:solidFill>
+          <a:ln>
+            <a:solidFill>
+              <a:srgbClr val="F8C0C0"/>
+            </a:solidFill>
+          </a:ln>
+        </p:spPr>
+        <p:style>
+          <a:lnRef idx="2">
+            <a:schemeClr val="accent1">
+              <a:shade val="50000"/>
+            </a:schemeClr>
+          </a:lnRef>
+          <a:fillRef idx="1">
+            <a:schemeClr val="accent1"/>
+          </a:fillRef>
+          <a:effectRef idx="0">
+            <a:schemeClr val="accent1"/>
+          </a:effectRef>
+          <a:fontRef idx="minor">
+            <a:schemeClr val="lt1"/>
+          </a:fontRef>
+        </p:style>
+        <p:txBody>
+          <a:bodyPr rtlCol="0" anchor="ctr"/>
+          <a:lstStyle/>
+          <a:p>
+            <a:pPr algn="ctr"/>
+            <a:endParaRPr lang="fr-FR"/>
+          </a:p>
+        </p:txBody>
+      </p:sp>
+      <p:sp>
+        <p:nvSpPr>
+          <p:cNvPr id="8" name="ZoneTexte 7"/>
+          <p:cNvSpPr txBox="1"/>
+          <p:nvPr/>
+        </p:nvSpPr>
+        <p:spPr>
+          <a:xfrm>
+            <a:off x="10931235" y="91440"/>
+            <a:ext cx="581891" cy="584775"/>
+          </a:xfrm>
+          <a:prstGeom prst="rect">
+            <a:avLst/>
+          </a:prstGeom>
+          <a:noFill/>
+        </p:spPr>
+        <p:txBody>
+          <a:bodyPr wrap="square" rtlCol="0">
+            <a:spAutoFit/>
+          </a:bodyPr>
+          <a:lstStyle/>
+          <a:p>
+            <a:pPr algn="ctr"/>
+            <a:r>
+              <a:rPr lang="fr-FR" sz="3200" dirty="0">
+                <a:solidFill>
+                  <a:schemeClr val="bg1"/>
+                </a:solidFill>
+              </a:rPr>
+              <a:t>6</a:t>
+            </a:r>
+            <a:endParaRPr lang="fr-FR" sz="3200" dirty="0">
+              <a:solidFill>
+                <a:schemeClr val="bg1"/>
+              </a:solidFill>
+            </a:endParaRPr>
+          </a:p>
+        </p:txBody>
+      </p:sp>
     </p:spTree>
     <p:extLst>
       <p:ext uri="{BB962C8B-B14F-4D97-AF65-F5344CB8AC3E}">
@@ -6478,6 +7005,93 @@
           </a:prstGeom>
         </p:spPr>
       </p:pic>
+      <p:sp>
+        <p:nvSpPr>
+          <p:cNvPr id="6" name="Pentagone 5"/>
+          <p:cNvSpPr/>
+          <p:nvPr/>
+        </p:nvSpPr>
+        <p:spPr>
+          <a:xfrm rot="5400000">
+            <a:off x="10702636" y="29095"/>
+            <a:ext cx="1039091" cy="980901"/>
+          </a:xfrm>
+          <a:prstGeom prst="homePlate">
+            <a:avLst/>
+          </a:prstGeom>
+          <a:solidFill>
+            <a:srgbClr val="F8C0C0"/>
+          </a:solidFill>
+          <a:ln>
+            <a:solidFill>
+              <a:srgbClr val="F8C0C0"/>
+            </a:solidFill>
+          </a:ln>
+        </p:spPr>
+        <p:style>
+          <a:lnRef idx="2">
+            <a:schemeClr val="accent1">
+              <a:shade val="50000"/>
+            </a:schemeClr>
+          </a:lnRef>
+          <a:fillRef idx="1">
+            <a:schemeClr val="accent1"/>
+          </a:fillRef>
+          <a:effectRef idx="0">
+            <a:schemeClr val="accent1"/>
+          </a:effectRef>
+          <a:fontRef idx="minor">
+            <a:schemeClr val="lt1"/>
+          </a:fontRef>
+        </p:style>
+        <p:txBody>
+          <a:bodyPr rtlCol="0" anchor="ctr"/>
+          <a:lstStyle/>
+          <a:p>
+            <a:pPr algn="ctr"/>
+            <a:endParaRPr lang="fr-FR"/>
+          </a:p>
+        </p:txBody>
+      </p:sp>
+      <p:sp>
+        <p:nvSpPr>
+          <p:cNvPr id="7" name="ZoneTexte 6"/>
+          <p:cNvSpPr txBox="1"/>
+          <p:nvPr/>
+        </p:nvSpPr>
+        <p:spPr>
+          <a:xfrm>
+            <a:off x="10931235" y="91440"/>
+            <a:ext cx="581891" cy="584775"/>
+          </a:xfrm>
+          <a:prstGeom prst="rect">
+            <a:avLst/>
+          </a:prstGeom>
+          <a:noFill/>
+        </p:spPr>
+        <p:txBody>
+          <a:bodyPr wrap="square" rtlCol="0">
+            <a:spAutoFit/>
+          </a:bodyPr>
+          <a:lstStyle/>
+          <a:p>
+            <a:pPr algn="ctr"/>
+            <a:r>
+              <a:rPr lang="fr-FR" sz="3200" dirty="0">
+                <a:solidFill>
+                  <a:schemeClr val="bg1"/>
+                </a:solidFill>
+              </a:rPr>
+              <a:t>7</a:t>
+            </a:r>
+            <a:endParaRPr lang="fr-FR" sz="3200" dirty="0">
+              <a:solidFill>
+                <a:schemeClr val="bg1"/>
+              </a:solidFill>
+            </a:endParaRPr>
+          </a:p>
+        </p:txBody>
+      </p:sp>
     </p:spTree>
     <p:extLst>
       <p:ext uri="{BB962C8B-B14F-4D97-AF65-F5344CB8AC3E}">
@@ -6538,6 +7152,93 @@
           </a:prstGeom>
         </p:spPr>
       </p:pic>
+      <p:sp>
+        <p:nvSpPr>
+          <p:cNvPr id="3" name="Pentagone 2"/>
+          <p:cNvSpPr/>
+          <p:nvPr/>
+        </p:nvSpPr>
+        <p:spPr>
+          <a:xfrm rot="5400000">
+            <a:off x="10702636" y="29095"/>
+            <a:ext cx="1039091" cy="980901"/>
+          </a:xfrm>
+          <a:prstGeom prst="homePlate">
+            <a:avLst/>
+          </a:prstGeom>
+          <a:solidFill>
+            <a:srgbClr val="F8C0C0"/>
+          </a:solidFill>
+          <a:ln>
+            <a:solidFill>
+              <a:srgbClr val="F8C0C0"/>
+            </a:solidFill>
+          </a:ln>
+        </p:spPr>
+        <p:style>
+          <a:lnRef idx="2">
+            <a:schemeClr val="accent1">
+              <a:shade val="50000"/>
+            </a:schemeClr>
+          </a:lnRef>
+          <a:fillRef idx="1">
+            <a:schemeClr val="accent1"/>
+          </a:fillRef>
+          <a:effectRef idx="0">
+            <a:schemeClr val="accent1"/>
+          </a:effectRef>
+          <a:fontRef idx="minor">
+            <a:schemeClr val="lt1"/>
+          </a:fontRef>
+        </p:style>
+        <p:txBody>
+          <a:bodyPr rtlCol="0" anchor="ctr"/>
+          <a:lstStyle/>
+          <a:p>
+            <a:pPr algn="ctr"/>
+            <a:endParaRPr lang="fr-FR"/>
+          </a:p>
+        </p:txBody>
+      </p:sp>
+      <p:sp>
+        <p:nvSpPr>
+          <p:cNvPr id="5" name="ZoneTexte 4"/>
+          <p:cNvSpPr txBox="1"/>
+          <p:nvPr/>
+        </p:nvSpPr>
+        <p:spPr>
+          <a:xfrm>
+            <a:off x="10931235" y="91440"/>
+            <a:ext cx="581891" cy="584775"/>
+          </a:xfrm>
+          <a:prstGeom prst="rect">
+            <a:avLst/>
+          </a:prstGeom>
+          <a:noFill/>
+        </p:spPr>
+        <p:txBody>
+          <a:bodyPr wrap="square" rtlCol="0">
+            <a:spAutoFit/>
+          </a:bodyPr>
+          <a:lstStyle/>
+          <a:p>
+            <a:pPr algn="ctr"/>
+            <a:r>
+              <a:rPr lang="fr-FR" sz="3200" dirty="0">
+                <a:solidFill>
+                  <a:schemeClr val="bg1"/>
+                </a:solidFill>
+              </a:rPr>
+              <a:t>8</a:t>
+            </a:r>
+            <a:endParaRPr lang="fr-FR" sz="3200" dirty="0">
+              <a:solidFill>
+                <a:schemeClr val="bg1"/>
+              </a:solidFill>
+            </a:endParaRPr>
+          </a:p>
+        </p:txBody>
+      </p:sp>
     </p:spTree>
     <p:extLst>
       <p:ext uri="{BB962C8B-B14F-4D97-AF65-F5344CB8AC3E}">
@@ -6604,6 +7305,93 @@
           </a:effectLst>
         </p:spPr>
       </p:pic>
+      <p:sp>
+        <p:nvSpPr>
+          <p:cNvPr id="3" name="Pentagone 2"/>
+          <p:cNvSpPr/>
+          <p:nvPr/>
+        </p:nvSpPr>
+        <p:spPr>
+          <a:xfrm rot="5400000">
+            <a:off x="10702636" y="29095"/>
+            <a:ext cx="1039091" cy="980901"/>
+          </a:xfrm>
+          <a:prstGeom prst="homePlate">
+            <a:avLst/>
+          </a:prstGeom>
+          <a:solidFill>
+            <a:srgbClr val="F8C0C0"/>
+          </a:solidFill>
+          <a:ln>
+            <a:solidFill>
+              <a:srgbClr val="F8C0C0"/>
+            </a:solidFill>
+          </a:ln>
+        </p:spPr>
+        <p:style>
+          <a:lnRef idx="2">
+            <a:schemeClr val="accent1">
+              <a:shade val="50000"/>
+            </a:schemeClr>
+          </a:lnRef>
+          <a:fillRef idx="1">
+            <a:schemeClr val="accent1"/>
+          </a:fillRef>
+          <a:effectRef idx="0">
+            <a:schemeClr val="accent1"/>
+          </a:effectRef>
+          <a:fontRef idx="minor">
+            <a:schemeClr val="lt1"/>
+          </a:fontRef>
+        </p:style>
+        <p:txBody>
+          <a:bodyPr rtlCol="0" anchor="ctr"/>
+          <a:lstStyle/>
+          <a:p>
+            <a:pPr algn="ctr"/>
+            <a:endParaRPr lang="fr-FR"/>
+          </a:p>
+        </p:txBody>
+      </p:sp>
+      <p:sp>
+        <p:nvSpPr>
+          <p:cNvPr id="5" name="ZoneTexte 4"/>
+          <p:cNvSpPr txBox="1"/>
+          <p:nvPr/>
+        </p:nvSpPr>
+        <p:spPr>
+          <a:xfrm>
+            <a:off x="10931235" y="91440"/>
+            <a:ext cx="581891" cy="584775"/>
+          </a:xfrm>
+          <a:prstGeom prst="rect">
+            <a:avLst/>
+          </a:prstGeom>
+          <a:noFill/>
+        </p:spPr>
+        <p:txBody>
+          <a:bodyPr wrap="square" rtlCol="0">
+            <a:spAutoFit/>
+          </a:bodyPr>
+          <a:lstStyle/>
+          <a:p>
+            <a:pPr algn="ctr"/>
+            <a:r>
+              <a:rPr lang="fr-FR" sz="3200" dirty="0">
+                <a:solidFill>
+                  <a:schemeClr val="bg1"/>
+                </a:solidFill>
+              </a:rPr>
+              <a:t>9</a:t>
+            </a:r>
+            <a:endParaRPr lang="fr-FR" sz="3200" dirty="0">
+              <a:solidFill>
+                <a:schemeClr val="bg1"/>
+              </a:solidFill>
+            </a:endParaRPr>
+          </a:p>
+        </p:txBody>
+      </p:sp>
     </p:spTree>
     <p:extLst>
       <p:ext uri="{BB962C8B-B14F-4D97-AF65-F5344CB8AC3E}">

</xml_diff>